<commit_message>
added more documentation to arduino build and added a system build powerpoint
</commit_message>
<xml_diff>
--- a/builds/Arduino.pptx
+++ b/builds/Arduino.pptx
@@ -14,7 +14,8 @@
     <p:sldId id="262" r:id="rId8"/>
     <p:sldId id="263" r:id="rId9"/>
     <p:sldId id="264" r:id="rId10"/>
-    <p:sldId id="265" r:id="rId11"/>
+    <p:sldId id="266" r:id="rId11"/>
+    <p:sldId id="265" r:id="rId12"/>
   </p:sldIdLst>
   <p:sldSz cx="12192000" cy="6858000"/>
   <p:notesSz cx="6858000" cy="9144000"/>
@@ -113,6 +114,11 @@
       </a:defRPr>
     </a:lvl9pPr>
   </p:defaultTextStyle>
+  <p:extLst>
+    <p:ext uri="{EFAFB233-063F-42B5-8137-9DF3F51BA10A}">
+      <p15:sldGuideLst xmlns:p15="http://schemas.microsoft.com/office/powerpoint/2012/main"/>
+    </p:ext>
+  </p:extLst>
 </p:presentation>
 </file>
 
@@ -263,7 +269,7 @@
           <a:p>
             <a:fld id="{1294FA10-8A10-47DB-A182-550F9DDB2F77}" type="datetimeFigureOut">
               <a:rPr lang="en-US" smtClean="0"/>
-              <a:t>8/10/2024</a:t>
+              <a:t>8/11/2024</a:t>
             </a:fld>
             <a:endParaRPr lang="en-US"/>
           </a:p>
@@ -461,7 +467,7 @@
           <a:p>
             <a:fld id="{1294FA10-8A10-47DB-A182-550F9DDB2F77}" type="datetimeFigureOut">
               <a:rPr lang="en-US" smtClean="0"/>
-              <a:t>8/10/2024</a:t>
+              <a:t>8/11/2024</a:t>
             </a:fld>
             <a:endParaRPr lang="en-US"/>
           </a:p>
@@ -669,7 +675,7 @@
           <a:p>
             <a:fld id="{1294FA10-8A10-47DB-A182-550F9DDB2F77}" type="datetimeFigureOut">
               <a:rPr lang="en-US" smtClean="0"/>
-              <a:t>8/10/2024</a:t>
+              <a:t>8/11/2024</a:t>
             </a:fld>
             <a:endParaRPr lang="en-US"/>
           </a:p>
@@ -867,7 +873,7 @@
           <a:p>
             <a:fld id="{1294FA10-8A10-47DB-A182-550F9DDB2F77}" type="datetimeFigureOut">
               <a:rPr lang="en-US" smtClean="0"/>
-              <a:t>8/10/2024</a:t>
+              <a:t>8/11/2024</a:t>
             </a:fld>
             <a:endParaRPr lang="en-US"/>
           </a:p>
@@ -1142,7 +1148,7 @@
           <a:p>
             <a:fld id="{1294FA10-8A10-47DB-A182-550F9DDB2F77}" type="datetimeFigureOut">
               <a:rPr lang="en-US" smtClean="0"/>
-              <a:t>8/10/2024</a:t>
+              <a:t>8/11/2024</a:t>
             </a:fld>
             <a:endParaRPr lang="en-US"/>
           </a:p>
@@ -1407,7 +1413,7 @@
           <a:p>
             <a:fld id="{1294FA10-8A10-47DB-A182-550F9DDB2F77}" type="datetimeFigureOut">
               <a:rPr lang="en-US" smtClean="0"/>
-              <a:t>8/10/2024</a:t>
+              <a:t>8/11/2024</a:t>
             </a:fld>
             <a:endParaRPr lang="en-US"/>
           </a:p>
@@ -1819,7 +1825,7 @@
           <a:p>
             <a:fld id="{1294FA10-8A10-47DB-A182-550F9DDB2F77}" type="datetimeFigureOut">
               <a:rPr lang="en-US" smtClean="0"/>
-              <a:t>8/10/2024</a:t>
+              <a:t>8/11/2024</a:t>
             </a:fld>
             <a:endParaRPr lang="en-US"/>
           </a:p>
@@ -1960,7 +1966,7 @@
           <a:p>
             <a:fld id="{1294FA10-8A10-47DB-A182-550F9DDB2F77}" type="datetimeFigureOut">
               <a:rPr lang="en-US" smtClean="0"/>
-              <a:t>8/10/2024</a:t>
+              <a:t>8/11/2024</a:t>
             </a:fld>
             <a:endParaRPr lang="en-US"/>
           </a:p>
@@ -2073,7 +2079,7 @@
           <a:p>
             <a:fld id="{1294FA10-8A10-47DB-A182-550F9DDB2F77}" type="datetimeFigureOut">
               <a:rPr lang="en-US" smtClean="0"/>
-              <a:t>8/10/2024</a:t>
+              <a:t>8/11/2024</a:t>
             </a:fld>
             <a:endParaRPr lang="en-US"/>
           </a:p>
@@ -2384,7 +2390,7 @@
           <a:p>
             <a:fld id="{1294FA10-8A10-47DB-A182-550F9DDB2F77}" type="datetimeFigureOut">
               <a:rPr lang="en-US" smtClean="0"/>
-              <a:t>8/10/2024</a:t>
+              <a:t>8/11/2024</a:t>
             </a:fld>
             <a:endParaRPr lang="en-US"/>
           </a:p>
@@ -2672,7 +2678,7 @@
           <a:p>
             <a:fld id="{1294FA10-8A10-47DB-A182-550F9DDB2F77}" type="datetimeFigureOut">
               <a:rPr lang="en-US" smtClean="0"/>
-              <a:t>8/10/2024</a:t>
+              <a:t>8/11/2024</a:t>
             </a:fld>
             <a:endParaRPr lang="en-US"/>
           </a:p>
@@ -2913,7 +2919,7 @@
           <a:p>
             <a:fld id="{1294FA10-8A10-47DB-A182-550F9DDB2F77}" type="datetimeFigureOut">
               <a:rPr lang="en-US" smtClean="0"/>
-              <a:t>8/10/2024</a:t>
+              <a:t>8/11/2024</a:t>
             </a:fld>
             <a:endParaRPr lang="en-US"/>
           </a:p>
@@ -3424,6 +3430,97 @@
           <p:cNvPr id="2" name="Title 1">
             <a:extLst>
               <a:ext uri="{FF2B5EF4-FFF2-40B4-BE49-F238E27FC236}">
+                <a16:creationId xmlns:a16="http://schemas.microsoft.com/office/drawing/2014/main" id="{C0F2BBF5-FCDF-9852-C51F-D262D1C955A3}"/>
+              </a:ext>
+            </a:extLst>
+          </p:cNvPr>
+          <p:cNvSpPr>
+            <a:spLocks noGrp="1"/>
+          </p:cNvSpPr>
+          <p:nvPr>
+            <p:ph type="title"/>
+          </p:nvPr>
+        </p:nvSpPr>
+        <p:spPr/>
+        <p:txBody>
+          <a:bodyPr/>
+          <a:lstStyle/>
+          <a:p>
+            <a:endParaRPr lang="en-US"/>
+          </a:p>
+        </p:txBody>
+      </p:sp>
+      <p:pic>
+        <p:nvPicPr>
+          <p:cNvPr id="5" name="Picture 4" descr="Graphical user interface, text, application&#10;&#10;Description automatically generated">
+            <a:extLst>
+              <a:ext uri="{FF2B5EF4-FFF2-40B4-BE49-F238E27FC236}">
+                <a16:creationId xmlns:a16="http://schemas.microsoft.com/office/drawing/2014/main" id="{AEED72D6-4D82-2812-C615-FC4607A72282}"/>
+              </a:ext>
+            </a:extLst>
+          </p:cNvPr>
+          <p:cNvPicPr>
+            <a:picLocks noChangeAspect="1"/>
+          </p:cNvPicPr>
+          <p:nvPr/>
+        </p:nvPicPr>
+        <p:blipFill>
+          <a:blip r:embed="rId2">
+            <a:extLst>
+              <a:ext uri="{28A0092B-C50C-407E-A947-70E740481C1C}">
+                <a14:useLocalDpi xmlns:a14="http://schemas.microsoft.com/office/drawing/2010/main" val="0"/>
+              </a:ext>
+            </a:extLst>
+          </a:blip>
+          <a:stretch>
+            <a:fillRect/>
+          </a:stretch>
+        </p:blipFill>
+        <p:spPr>
+          <a:xfrm>
+            <a:off x="958788" y="1027906"/>
+            <a:ext cx="10014012" cy="5632882"/>
+          </a:xfrm>
+          <a:prstGeom prst="rect">
+            <a:avLst/>
+          </a:prstGeom>
+        </p:spPr>
+      </p:pic>
+    </p:spTree>
+    <p:extLst>
+      <p:ext uri="{BB962C8B-B14F-4D97-AF65-F5344CB8AC3E}">
+        <p14:creationId xmlns:p14="http://schemas.microsoft.com/office/powerpoint/2010/main" val="1668800768"/>
+      </p:ext>
+    </p:extLst>
+  </p:cSld>
+  <p:clrMapOvr>
+    <a:masterClrMapping/>
+  </p:clrMapOvr>
+</p:sld>
+</file>
+
+<file path=ppt/slides/slide11.xml><?xml version="1.0" encoding="utf-8"?>
+<p:sld xmlns:a="http://schemas.openxmlformats.org/drawingml/2006/main" xmlns:r="http://schemas.openxmlformats.org/officeDocument/2006/relationships" xmlns:p="http://schemas.openxmlformats.org/presentationml/2006/main">
+  <p:cSld>
+    <p:spTree>
+      <p:nvGrpSpPr>
+        <p:cNvPr id="1" name=""/>
+        <p:cNvGrpSpPr/>
+        <p:nvPr/>
+      </p:nvGrpSpPr>
+      <p:grpSpPr>
+        <a:xfrm>
+          <a:off x="0" y="0"/>
+          <a:ext cx="0" cy="0"/>
+          <a:chOff x="0" y="0"/>
+          <a:chExt cx="0" cy="0"/>
+        </a:xfrm>
+      </p:grpSpPr>
+      <p:sp>
+        <p:nvSpPr>
+          <p:cNvPr id="2" name="Title 1">
+            <a:extLst>
+              <a:ext uri="{FF2B5EF4-FFF2-40B4-BE49-F238E27FC236}">
                 <a16:creationId xmlns:a16="http://schemas.microsoft.com/office/drawing/2014/main" id="{B912BD32-D63E-819D-B3F1-30389B78589A}"/>
               </a:ext>
             </a:extLst>
@@ -3440,35 +3537,48 @@
           <a:bodyPr/>
           <a:lstStyle/>
           <a:p>
-            <a:endParaRPr lang="en-US"/>
-          </a:p>
-        </p:txBody>
-      </p:sp>
-      <p:sp>
-        <p:nvSpPr>
-          <p:cNvPr id="3" name="Content Placeholder 2">
-            <a:extLst>
-              <a:ext uri="{FF2B5EF4-FFF2-40B4-BE49-F238E27FC236}">
-                <a16:creationId xmlns:a16="http://schemas.microsoft.com/office/drawing/2014/main" id="{9CCD94C7-923F-1975-6F43-407F246C8028}"/>
-              </a:ext>
-            </a:extLst>
-          </p:cNvPr>
-          <p:cNvSpPr>
-            <a:spLocks noGrp="1"/>
-          </p:cNvSpPr>
+            <a:r>
+              <a:rPr lang="en-US" dirty="0"/>
+              <a:t>Send control characters down serial</a:t>
+            </a:r>
+          </a:p>
+        </p:txBody>
+      </p:sp>
+      <p:pic>
+        <p:nvPicPr>
+          <p:cNvPr id="5" name="Content Placeholder 4" descr="Graphical user interface, text, application&#10;&#10;Description automatically generated">
+            <a:extLst>
+              <a:ext uri="{FF2B5EF4-FFF2-40B4-BE49-F238E27FC236}">
+                <a16:creationId xmlns:a16="http://schemas.microsoft.com/office/drawing/2014/main" id="{18433650-B28E-2F63-A375-AF35E802FBE5}"/>
+              </a:ext>
+            </a:extLst>
+          </p:cNvPr>
+          <p:cNvPicPr>
+            <a:picLocks noGrp="1" noChangeAspect="1"/>
+          </p:cNvPicPr>
           <p:nvPr>
             <p:ph idx="1"/>
           </p:nvPr>
-        </p:nvSpPr>
-        <p:spPr/>
-        <p:txBody>
-          <a:bodyPr/>
-          <a:lstStyle/>
-          <a:p>
-            <a:endParaRPr lang="en-US"/>
-          </a:p>
-        </p:txBody>
-      </p:sp>
+        </p:nvPicPr>
+        <p:blipFill>
+          <a:blip r:embed="rId2">
+            <a:extLst>
+              <a:ext uri="{28A0092B-C50C-407E-A947-70E740481C1C}">
+                <a14:useLocalDpi xmlns:a14="http://schemas.microsoft.com/office/drawing/2010/main" val="0"/>
+              </a:ext>
+            </a:extLst>
+          </a:blip>
+          <a:stretch>
+            <a:fillRect/>
+          </a:stretch>
+        </p:blipFill>
+        <p:spPr>
+          <a:xfrm>
+            <a:off x="2228144" y="1825625"/>
+            <a:ext cx="7735712" cy="4351338"/>
+          </a:xfrm>
+        </p:spPr>
+      </p:pic>
     </p:spTree>
     <p:extLst>
       <p:ext uri="{BB962C8B-B14F-4D97-AF65-F5344CB8AC3E}">
@@ -3892,7 +4002,10 @@
           <a:bodyPr/>
           <a:lstStyle/>
           <a:p>
-            <a:endParaRPr lang="en-US"/>
+            <a:r>
+              <a:rPr lang="en-US" dirty="0"/>
+              <a:t>Select the UNO</a:t>
+            </a:r>
           </a:p>
         </p:txBody>
       </p:sp>
@@ -3932,6 +4045,52 @@
           </a:prstGeom>
         </p:spPr>
       </p:pic>
+      <p:sp>
+        <p:nvSpPr>
+          <p:cNvPr id="3" name="Arrow: Right 2">
+            <a:extLst>
+              <a:ext uri="{FF2B5EF4-FFF2-40B4-BE49-F238E27FC236}">
+                <a16:creationId xmlns:a16="http://schemas.microsoft.com/office/drawing/2014/main" id="{3FA63970-9E97-7CB7-547C-31881F3EEB03}"/>
+              </a:ext>
+            </a:extLst>
+          </p:cNvPr>
+          <p:cNvSpPr/>
+          <p:nvPr/>
+        </p:nvSpPr>
+        <p:spPr>
+          <a:xfrm flipH="1">
+            <a:off x="8416031" y="1921813"/>
+            <a:ext cx="542126" cy="270972"/>
+          </a:xfrm>
+          <a:prstGeom prst="rightArrow">
+            <a:avLst/>
+          </a:prstGeom>
+        </p:spPr>
+        <p:style>
+          <a:lnRef idx="2">
+            <a:schemeClr val="accent1">
+              <a:shade val="15000"/>
+            </a:schemeClr>
+          </a:lnRef>
+          <a:fillRef idx="1">
+            <a:schemeClr val="accent1"/>
+          </a:fillRef>
+          <a:effectRef idx="0">
+            <a:schemeClr val="accent1"/>
+          </a:effectRef>
+          <a:fontRef idx="minor">
+            <a:schemeClr val="lt1"/>
+          </a:fontRef>
+        </p:style>
+        <p:txBody>
+          <a:bodyPr rtlCol="0" anchor="ctr"/>
+          <a:lstStyle/>
+          <a:p>
+            <a:pPr algn="ctr"/>
+            <a:endParaRPr lang="en-US"/>
+          </a:p>
+        </p:txBody>
+      </p:sp>
     </p:spTree>
     <p:extLst>
       <p:ext uri="{BB962C8B-B14F-4D97-AF65-F5344CB8AC3E}">

</xml_diff>